<commit_message>
-adding some more sens/spec values for PCA analysis
</commit_message>
<xml_diff>
--- a/poster/machine-learning.pptx
+++ b/poster/machine-learning.pptx
@@ -4595,7 +4595,7 @@
           <p:nvPr>
             <p:extLst>
               <p:ext uri="{D42A27DB-BD31-4B8C-83A1-F6EECF244321}">
-                <p14:modId xmlns:p14="http://schemas.microsoft.com/office/powerpoint/2010/main" val="385452617"/>
+                <p14:modId xmlns:p14="http://schemas.microsoft.com/office/powerpoint/2010/main" val="2210603307"/>
               </p:ext>
             </p:extLst>
           </p:nvPr>
@@ -5017,6 +5017,10 @@
                     <a:lstStyle/>
                     <a:p>
                       <a:pPr algn="ctr"/>
+                      <a:r>
+                        <a:rPr lang="en-CA" sz="800" dirty="0" smtClean="0"/>
+                        <a:t>0.70</a:t>
+                      </a:r>
                       <a:endParaRPr lang="en-CA" sz="800" dirty="0"/>
                     </a:p>
                   </a:txBody>
@@ -5028,6 +5032,10 @@
                     <a:lstStyle/>
                     <a:p>
                       <a:pPr algn="ctr"/>
+                      <a:r>
+                        <a:rPr lang="en-CA" sz="800" dirty="0" smtClean="0"/>
+                        <a:t>0.66</a:t>
+                      </a:r>
                       <a:endParaRPr lang="en-CA" sz="800" dirty="0"/>
                     </a:p>
                   </a:txBody>
@@ -5039,6 +5047,10 @@
                     <a:lstStyle/>
                     <a:p>
                       <a:pPr algn="ctr"/>
+                      <a:r>
+                        <a:rPr lang="en-CA" sz="800" dirty="0" smtClean="0"/>
+                        <a:t>0.60</a:t>
+                      </a:r>
                       <a:endParaRPr lang="en-CA" sz="800" dirty="0"/>
                     </a:p>
                   </a:txBody>
@@ -5050,6 +5062,10 @@
                     <a:lstStyle/>
                     <a:p>
                       <a:pPr algn="ctr"/>
+                      <a:r>
+                        <a:rPr lang="en-CA" sz="800" dirty="0" smtClean="0"/>
+                        <a:t>0.67</a:t>
+                      </a:r>
                       <a:endParaRPr lang="en-CA" sz="800" dirty="0"/>
                     </a:p>
                   </a:txBody>
@@ -5153,6 +5169,10 @@
                     <a:lstStyle/>
                     <a:p>
                       <a:pPr algn="ctr"/>
+                      <a:r>
+                        <a:rPr lang="en-CA" sz="800" dirty="0" smtClean="0"/>
+                        <a:t>0.26</a:t>
+                      </a:r>
                       <a:endParaRPr lang="en-CA" sz="800" dirty="0"/>
                     </a:p>
                   </a:txBody>
@@ -5164,6 +5184,10 @@
                     <a:lstStyle/>
                     <a:p>
                       <a:pPr algn="ctr"/>
+                      <a:r>
+                        <a:rPr lang="en-CA" sz="800" dirty="0" smtClean="0"/>
+                        <a:t>0.91</a:t>
+                      </a:r>
                       <a:endParaRPr lang="en-CA" sz="800" dirty="0"/>
                     </a:p>
                   </a:txBody>
@@ -5175,6 +5199,10 @@
                     <a:lstStyle/>
                     <a:p>
                       <a:pPr algn="ctr"/>
+                      <a:r>
+                        <a:rPr lang="en-CA" sz="800" dirty="0" smtClean="0"/>
+                        <a:t>0.11</a:t>
+                      </a:r>
                       <a:endParaRPr lang="en-CA" sz="800" dirty="0"/>
                     </a:p>
                   </a:txBody>
@@ -5186,6 +5214,10 @@
                     <a:lstStyle/>
                     <a:p>
                       <a:pPr algn="ctr"/>
+                      <a:r>
+                        <a:rPr lang="en-CA" sz="800" dirty="0" smtClean="0"/>
+                        <a:t>0.92</a:t>
+                      </a:r>
                       <a:endParaRPr lang="en-CA" sz="800" dirty="0"/>
                     </a:p>
                   </a:txBody>
@@ -5289,6 +5321,10 @@
                     <a:lstStyle/>
                     <a:p>
                       <a:pPr algn="ctr"/>
+                      <a:r>
+                        <a:rPr lang="en-CA" sz="800" dirty="0" smtClean="0"/>
+                        <a:t>0.44</a:t>
+                      </a:r>
                       <a:endParaRPr lang="en-CA" sz="800" dirty="0"/>
                     </a:p>
                   </a:txBody>
@@ -5300,6 +5336,10 @@
                     <a:lstStyle/>
                     <a:p>
                       <a:pPr algn="ctr"/>
+                      <a:r>
+                        <a:rPr lang="en-CA" sz="800" dirty="0" smtClean="0"/>
+                        <a:t>0.94</a:t>
+                      </a:r>
                       <a:endParaRPr lang="en-CA" sz="800" dirty="0"/>
                     </a:p>
                   </a:txBody>
@@ -5311,6 +5351,10 @@
                     <a:lstStyle/>
                     <a:p>
                       <a:pPr algn="ctr"/>
+                      <a:r>
+                        <a:rPr lang="en-CA" sz="800" dirty="0" smtClean="0"/>
+                        <a:t>0.26</a:t>
+                      </a:r>
                       <a:endParaRPr lang="en-CA" sz="800" dirty="0"/>
                     </a:p>
                   </a:txBody>
@@ -5322,6 +5366,10 @@
                     <a:lstStyle/>
                     <a:p>
                       <a:pPr algn="ctr"/>
+                      <a:r>
+                        <a:rPr lang="en-CA" sz="800" dirty="0" smtClean="0"/>
+                        <a:t>0.91</a:t>
+                      </a:r>
                       <a:endParaRPr lang="en-CA" sz="800" dirty="0"/>
                     </a:p>
                   </a:txBody>
@@ -5478,7 +5526,7 @@
         </p:blipFill>
         <p:spPr>
           <a:xfrm>
-            <a:off x="3661148" y="6876255"/>
+            <a:off x="3796989" y="7122705"/>
             <a:ext cx="3001317" cy="2021295"/>
           </a:xfrm>
           <a:prstGeom prst="rect">

</xml_diff>

<commit_message>
-changed table colours, added new data
</commit_message>
<xml_diff>
--- a/poster/machine-learning.pptx
+++ b/poster/machine-learning.pptx
@@ -3216,20 +3216,20 @@
           <p:nvPr>
             <p:extLst>
               <p:ext uri="{D42A27DB-BD31-4B8C-83A1-F6EECF244321}">
-                <p14:modId xmlns:p14="http://schemas.microsoft.com/office/powerpoint/2010/main" val="1249663640"/>
+                <p14:modId xmlns:p14="http://schemas.microsoft.com/office/powerpoint/2010/main" val="1697204142"/>
               </p:ext>
             </p:extLst>
           </p:nvPr>
         </p:nvGraphicFramePr>
         <p:xfrm>
           <a:off x="260644" y="4951787"/>
-          <a:ext cx="6408724" cy="3312366"/>
+          <a:ext cx="6408724" cy="2932578"/>
         </p:xfrm>
         <a:graphic>
           <a:graphicData uri="http://schemas.openxmlformats.org/drawingml/2006/table">
             <a:tbl>
               <a:tblPr firstRow="1" bandCol="1">
-                <a:tableStyleId>{5C22544A-7EE6-4342-B048-85BDC9FD1C3A}</a:tableStyleId>
+                <a:tableStyleId>{073A0DAA-6AF3-43AB-8588-CEC1D06C72B9}</a:tableStyleId>
               </a:tblPr>
               <a:tblGrid>
                 <a:gridCol w="936108"/>
@@ -3242,122 +3242,167 @@
                 <a:gridCol w="684077"/>
                 <a:gridCol w="684077"/>
               </a:tblGrid>
-              <a:tr h="356116">
-                <a:tc>
-                  <a:txBody>
-                    <a:bodyPr/>
-                    <a:lstStyle/>
-                    <a:p>
-                      <a:endParaRPr lang="en-CA" sz="1100" dirty="0"/>
-                    </a:p>
-                  </a:txBody>
-                  <a:tcPr/>
-                </a:tc>
-                <a:tc gridSpan="4">
-                  <a:txBody>
-                    <a:bodyPr/>
-                    <a:lstStyle/>
-                    <a:p>
-                      <a:pPr algn="ctr"/>
-                      <a:r>
-                        <a:rPr lang="en-CA" sz="1200" dirty="0" smtClean="0"/>
-                        <a:t>Random forest</a:t>
-                      </a:r>
-                      <a:endParaRPr lang="en-CA" sz="1200" dirty="0"/>
-                    </a:p>
-                  </a:txBody>
-                  <a:tcPr/>
-                </a:tc>
-                <a:tc hMerge="1">
-                  <a:txBody>
-                    <a:bodyPr/>
-                    <a:lstStyle/>
-                    <a:p>
-                      <a:endParaRPr lang="en-CA" dirty="0"/>
-                    </a:p>
-                  </a:txBody>
-                  <a:tcPr/>
-                </a:tc>
-                <a:tc hMerge="1">
-                  <a:txBody>
-                    <a:bodyPr/>
-                    <a:lstStyle/>
-                    <a:p>
-                      <a:endParaRPr lang="en-CA" dirty="0"/>
-                    </a:p>
-                  </a:txBody>
-                  <a:tcPr/>
-                </a:tc>
-                <a:tc hMerge="1">
-                  <a:txBody>
-                    <a:bodyPr/>
-                    <a:lstStyle/>
-                    <a:p>
-                      <a:endParaRPr lang="en-CA" dirty="0"/>
-                    </a:p>
-                  </a:txBody>
-                  <a:tcPr/>
-                </a:tc>
-                <a:tc gridSpan="4">
-                  <a:txBody>
-                    <a:bodyPr/>
-                    <a:lstStyle/>
-                    <a:p>
-                      <a:pPr algn="ctr"/>
-                      <a:r>
-                        <a:rPr lang="en-CA" sz="1200" dirty="0" smtClean="0"/>
-                        <a:t>Support vector machine</a:t>
-                      </a:r>
-                      <a:endParaRPr lang="en-CA" sz="1200" dirty="0"/>
-                    </a:p>
-                  </a:txBody>
-                  <a:tcPr/>
-                </a:tc>
-                <a:tc hMerge="1">
-                  <a:txBody>
-                    <a:bodyPr/>
-                    <a:lstStyle/>
-                    <a:p>
-                      <a:endParaRPr lang="en-CA" dirty="0"/>
-                    </a:p>
-                  </a:txBody>
-                  <a:tcPr/>
-                </a:tc>
-                <a:tc hMerge="1">
-                  <a:txBody>
-                    <a:bodyPr/>
-                    <a:lstStyle/>
-                    <a:p>
-                      <a:endParaRPr lang="en-CA"/>
-                    </a:p>
-                  </a:txBody>
-                  <a:tcPr/>
-                </a:tc>
-                <a:tc hMerge="1">
-                  <a:txBody>
-                    <a:bodyPr/>
-                    <a:lstStyle/>
-                    <a:p>
-                      <a:endParaRPr lang="en-CA" dirty="0"/>
-                    </a:p>
-                  </a:txBody>
-                  <a:tcPr/>
-                </a:tc>
-              </a:tr>
-              <a:tr h="356116">
-                <a:tc>
-                  <a:txBody>
-                    <a:bodyPr/>
-                    <a:lstStyle/>
-                    <a:p>
-                      <a:endParaRPr lang="en-CA" sz="1100"/>
+              <a:tr h="325842">
+                <a:tc>
+                  <a:txBody>
+                    <a:bodyPr/>
+                    <a:lstStyle/>
+                    <a:p>
+                      <a:endParaRPr lang="en-CA" sz="1100" dirty="0">
+                        <a:solidFill>
+                          <a:schemeClr val="bg1"/>
+                        </a:solidFill>
+                      </a:endParaRPr>
                     </a:p>
                   </a:txBody>
                   <a:tcPr>
                     <a:solidFill>
-                      <a:schemeClr val="tx2">
-                        <a:lumMod val="60000"/>
-                        <a:lumOff val="40000"/>
+                      <a:schemeClr val="tx1">
+                        <a:lumMod val="75000"/>
+                        <a:lumOff val="25000"/>
+                      </a:schemeClr>
+                    </a:solidFill>
+                  </a:tcPr>
+                </a:tc>
+                <a:tc gridSpan="4">
+                  <a:txBody>
+                    <a:bodyPr/>
+                    <a:lstStyle/>
+                    <a:p>
+                      <a:pPr algn="ctr"/>
+                      <a:r>
+                        <a:rPr lang="en-CA" sz="1200" dirty="0" smtClean="0">
+                          <a:solidFill>
+                            <a:schemeClr val="bg1"/>
+                          </a:solidFill>
+                        </a:rPr>
+                        <a:t>Random forest</a:t>
+                      </a:r>
+                      <a:endParaRPr lang="en-CA" sz="1200" dirty="0">
+                        <a:solidFill>
+                          <a:schemeClr val="bg1"/>
+                        </a:solidFill>
+                      </a:endParaRPr>
+                    </a:p>
+                  </a:txBody>
+                  <a:tcPr>
+                    <a:solidFill>
+                      <a:schemeClr val="tx1">
+                        <a:lumMod val="75000"/>
+                        <a:lumOff val="25000"/>
+                      </a:schemeClr>
+                    </a:solidFill>
+                  </a:tcPr>
+                </a:tc>
+                <a:tc hMerge="1">
+                  <a:txBody>
+                    <a:bodyPr/>
+                    <a:lstStyle/>
+                    <a:p>
+                      <a:endParaRPr lang="en-CA" dirty="0"/>
+                    </a:p>
+                  </a:txBody>
+                  <a:tcPr/>
+                </a:tc>
+                <a:tc hMerge="1">
+                  <a:txBody>
+                    <a:bodyPr/>
+                    <a:lstStyle/>
+                    <a:p>
+                      <a:endParaRPr lang="en-CA" dirty="0"/>
+                    </a:p>
+                  </a:txBody>
+                  <a:tcPr/>
+                </a:tc>
+                <a:tc hMerge="1">
+                  <a:txBody>
+                    <a:bodyPr/>
+                    <a:lstStyle/>
+                    <a:p>
+                      <a:endParaRPr lang="en-CA" dirty="0"/>
+                    </a:p>
+                  </a:txBody>
+                  <a:tcPr/>
+                </a:tc>
+                <a:tc gridSpan="4">
+                  <a:txBody>
+                    <a:bodyPr/>
+                    <a:lstStyle/>
+                    <a:p>
+                      <a:pPr algn="ctr"/>
+                      <a:r>
+                        <a:rPr lang="en-CA" sz="1200" dirty="0" smtClean="0">
+                          <a:solidFill>
+                            <a:schemeClr val="bg1"/>
+                          </a:solidFill>
+                        </a:rPr>
+                        <a:t>Support vector machine</a:t>
+                      </a:r>
+                      <a:endParaRPr lang="en-CA" sz="1200" dirty="0">
+                        <a:solidFill>
+                          <a:schemeClr val="bg1"/>
+                        </a:solidFill>
+                      </a:endParaRPr>
+                    </a:p>
+                  </a:txBody>
+                  <a:tcPr>
+                    <a:solidFill>
+                      <a:schemeClr val="tx1">
+                        <a:lumMod val="75000"/>
+                        <a:lumOff val="25000"/>
+                      </a:schemeClr>
+                    </a:solidFill>
+                  </a:tcPr>
+                </a:tc>
+                <a:tc hMerge="1">
+                  <a:txBody>
+                    <a:bodyPr/>
+                    <a:lstStyle/>
+                    <a:p>
+                      <a:endParaRPr lang="en-CA" dirty="0"/>
+                    </a:p>
+                  </a:txBody>
+                  <a:tcPr/>
+                </a:tc>
+                <a:tc hMerge="1">
+                  <a:txBody>
+                    <a:bodyPr/>
+                    <a:lstStyle/>
+                    <a:p>
+                      <a:endParaRPr lang="en-CA"/>
+                    </a:p>
+                  </a:txBody>
+                  <a:tcPr/>
+                </a:tc>
+                <a:tc hMerge="1">
+                  <a:txBody>
+                    <a:bodyPr/>
+                    <a:lstStyle/>
+                    <a:p>
+                      <a:endParaRPr lang="en-CA" dirty="0"/>
+                    </a:p>
+                  </a:txBody>
+                  <a:tcPr/>
+                </a:tc>
+              </a:tr>
+              <a:tr h="325842">
+                <a:tc>
+                  <a:txBody>
+                    <a:bodyPr/>
+                    <a:lstStyle/>
+                    <a:p>
+                      <a:endParaRPr lang="en-CA" sz="1100">
+                        <a:solidFill>
+                          <a:schemeClr val="bg1"/>
+                        </a:solidFill>
+                      </a:endParaRPr>
+                    </a:p>
+                  </a:txBody>
+                  <a:tcPr>
+                    <a:solidFill>
+                      <a:schemeClr val="tx1">
+                        <a:lumMod val="50000"/>
+                        <a:lumOff val="50000"/>
                       </a:schemeClr>
                     </a:solidFill>
                   </a:tcPr>
@@ -3385,9 +3430,9 @@
                   </a:txBody>
                   <a:tcPr>
                     <a:solidFill>
-                      <a:schemeClr val="tx2">
-                        <a:lumMod val="60000"/>
-                        <a:lumOff val="40000"/>
+                      <a:schemeClr val="tx1">
+                        <a:lumMod val="50000"/>
+                        <a:lumOff val="50000"/>
                       </a:schemeClr>
                     </a:solidFill>
                   </a:tcPr>
@@ -3425,9 +3470,9 @@
                   </a:txBody>
                   <a:tcPr>
                     <a:solidFill>
-                      <a:schemeClr val="tx2">
-                        <a:lumMod val="60000"/>
-                        <a:lumOff val="40000"/>
+                      <a:schemeClr val="tx1">
+                        <a:lumMod val="50000"/>
+                        <a:lumOff val="50000"/>
                       </a:schemeClr>
                     </a:solidFill>
                   </a:tcPr>
@@ -3465,9 +3510,9 @@
                   </a:txBody>
                   <a:tcPr>
                     <a:solidFill>
-                      <a:schemeClr val="tx2">
-                        <a:lumMod val="60000"/>
-                        <a:lumOff val="40000"/>
+                      <a:schemeClr val="tx1">
+                        <a:lumMod val="50000"/>
+                        <a:lumOff val="50000"/>
                       </a:schemeClr>
                     </a:solidFill>
                   </a:tcPr>
@@ -3505,9 +3550,9 @@
                   </a:txBody>
                   <a:tcPr>
                     <a:solidFill>
-                      <a:schemeClr val="tx2">
-                        <a:lumMod val="60000"/>
-                        <a:lumOff val="40000"/>
+                      <a:schemeClr val="tx1">
+                        <a:lumMod val="50000"/>
+                        <a:lumOff val="50000"/>
                       </a:schemeClr>
                     </a:solidFill>
                   </a:tcPr>
@@ -3523,20 +3568,23 @@
                   <a:tcPr/>
                 </a:tc>
               </a:tr>
-              <a:tr h="356116">
-                <a:tc>
-                  <a:txBody>
-                    <a:bodyPr/>
-                    <a:lstStyle/>
-                    <a:p>
-                      <a:endParaRPr lang="en-CA" sz="1100"/>
+              <a:tr h="325842">
+                <a:tc>
+                  <a:txBody>
+                    <a:bodyPr/>
+                    <a:lstStyle/>
+                    <a:p>
+                      <a:endParaRPr lang="en-CA" sz="1100">
+                        <a:solidFill>
+                          <a:schemeClr val="bg1"/>
+                        </a:solidFill>
+                      </a:endParaRPr>
                     </a:p>
                   </a:txBody>
                   <a:tcPr>
                     <a:solidFill>
-                      <a:schemeClr val="tx2">
-                        <a:lumMod val="40000"/>
-                        <a:lumOff val="60000"/>
+                      <a:schemeClr val="bg1">
+                        <a:lumMod val="65000"/>
                       </a:schemeClr>
                     </a:solidFill>
                   </a:tcPr>
@@ -3564,9 +3612,8 @@
                   </a:txBody>
                   <a:tcPr>
                     <a:solidFill>
-                      <a:schemeClr val="tx2">
-                        <a:lumMod val="40000"/>
-                        <a:lumOff val="60000"/>
+                      <a:schemeClr val="bg1">
+                        <a:lumMod val="65000"/>
                       </a:schemeClr>
                     </a:solidFill>
                   </a:tcPr>
@@ -3594,9 +3641,8 @@
                   </a:txBody>
                   <a:tcPr>
                     <a:solidFill>
-                      <a:schemeClr val="tx2">
-                        <a:lumMod val="40000"/>
-                        <a:lumOff val="60000"/>
+                      <a:schemeClr val="bg1">
+                        <a:lumMod val="65000"/>
                       </a:schemeClr>
                     </a:solidFill>
                   </a:tcPr>
@@ -3624,9 +3670,8 @@
                   </a:txBody>
                   <a:tcPr>
                     <a:solidFill>
-                      <a:schemeClr val="tx2">
-                        <a:lumMod val="40000"/>
-                        <a:lumOff val="60000"/>
+                      <a:schemeClr val="bg1">
+                        <a:lumMod val="65000"/>
                       </a:schemeClr>
                     </a:solidFill>
                   </a:tcPr>
@@ -3654,9 +3699,8 @@
                   </a:txBody>
                   <a:tcPr>
                     <a:solidFill>
-                      <a:schemeClr val="tx2">
-                        <a:lumMod val="40000"/>
-                        <a:lumOff val="60000"/>
+                      <a:schemeClr val="bg1">
+                        <a:lumMod val="65000"/>
                       </a:schemeClr>
                     </a:solidFill>
                   </a:tcPr>
@@ -3684,9 +3728,8 @@
                   </a:txBody>
                   <a:tcPr>
                     <a:solidFill>
-                      <a:schemeClr val="tx2">
-                        <a:lumMod val="40000"/>
-                        <a:lumOff val="60000"/>
+                      <a:schemeClr val="bg1">
+                        <a:lumMod val="65000"/>
                       </a:schemeClr>
                     </a:solidFill>
                   </a:tcPr>
@@ -3714,9 +3757,8 @@
                   </a:txBody>
                   <a:tcPr>
                     <a:solidFill>
-                      <a:schemeClr val="tx2">
-                        <a:lumMod val="40000"/>
-                        <a:lumOff val="60000"/>
+                      <a:schemeClr val="bg1">
+                        <a:lumMod val="65000"/>
                       </a:schemeClr>
                     </a:solidFill>
                   </a:tcPr>
@@ -3744,9 +3786,8 @@
                   </a:txBody>
                   <a:tcPr>
                     <a:solidFill>
-                      <a:schemeClr val="tx2">
-                        <a:lumMod val="40000"/>
-                        <a:lumOff val="60000"/>
+                      <a:schemeClr val="bg1">
+                        <a:lumMod val="65000"/>
                       </a:schemeClr>
                     </a:solidFill>
                   </a:tcPr>
@@ -3774,15 +3815,14 @@
                   </a:txBody>
                   <a:tcPr>
                     <a:solidFill>
-                      <a:schemeClr val="tx2">
-                        <a:lumMod val="40000"/>
-                        <a:lumOff val="60000"/>
+                      <a:schemeClr val="bg1">
+                        <a:lumMod val="65000"/>
                       </a:schemeClr>
                     </a:solidFill>
                   </a:tcPr>
                 </a:tc>
               </a:tr>
-              <a:tr h="374003">
+              <a:tr h="325842">
                 <a:tc>
                   <a:txBody>
                     <a:bodyPr/>
@@ -3805,7 +3845,7 @@
                       <a:pPr algn="ctr"/>
                       <a:r>
                         <a:rPr lang="en-CA" sz="1100" dirty="0" smtClean="0"/>
-                        <a:t>0.52</a:t>
+                        <a:t>0.57</a:t>
                       </a:r>
                       <a:endParaRPr lang="en-CA" sz="1100" dirty="0"/>
                     </a:p>
@@ -3918,7 +3958,7 @@
                   <a:tcPr/>
                 </a:tc>
               </a:tr>
-              <a:tr h="374003">
+              <a:tr h="325842">
                 <a:tc>
                   <a:txBody>
                     <a:bodyPr/>
@@ -4029,24 +4069,32 @@
                     <a:lstStyle/>
                     <a:p>
                       <a:pPr algn="ctr"/>
-                      <a:endParaRPr lang="en-CA" sz="1100"/>
-                    </a:p>
-                  </a:txBody>
-                  <a:tcPr/>
-                </a:tc>
-                <a:tc>
-                  <a:txBody>
-                    <a:bodyPr/>
-                    <a:lstStyle/>
-                    <a:p>
-                      <a:pPr algn="ctr"/>
+                      <a:r>
+                        <a:rPr lang="en-CA" sz="1100" dirty="0" smtClean="0"/>
+                        <a:t>0.85</a:t>
+                      </a:r>
                       <a:endParaRPr lang="en-CA" sz="1100" dirty="0"/>
                     </a:p>
                   </a:txBody>
                   <a:tcPr/>
                 </a:tc>
+                <a:tc>
+                  <a:txBody>
+                    <a:bodyPr/>
+                    <a:lstStyle/>
+                    <a:p>
+                      <a:pPr algn="ctr"/>
+                      <a:r>
+                        <a:rPr lang="en-CA" sz="1100" dirty="0" smtClean="0"/>
+                        <a:t>0.69</a:t>
+                      </a:r>
+                      <a:endParaRPr lang="en-CA" sz="1100" dirty="0"/>
+                    </a:p>
+                  </a:txBody>
+                  <a:tcPr/>
+                </a:tc>
               </a:tr>
-              <a:tr h="374003">
+              <a:tr h="325842">
                 <a:tc>
                   <a:txBody>
                     <a:bodyPr/>
@@ -4157,24 +4205,32 @@
                     <a:lstStyle/>
                     <a:p>
                       <a:pPr algn="ctr"/>
-                      <a:endParaRPr lang="en-CA" sz="1100"/>
-                    </a:p>
-                  </a:txBody>
-                  <a:tcPr/>
-                </a:tc>
-                <a:tc>
-                  <a:txBody>
-                    <a:bodyPr/>
-                    <a:lstStyle/>
-                    <a:p>
-                      <a:pPr algn="ctr"/>
-                      <a:endParaRPr lang="en-CA" sz="1100"/>
+                      <a:r>
+                        <a:rPr lang="en-CA" sz="1100" dirty="0" smtClean="0"/>
+                        <a:t>0.99</a:t>
+                      </a:r>
+                      <a:endParaRPr lang="en-CA" sz="1100" dirty="0"/>
+                    </a:p>
+                  </a:txBody>
+                  <a:tcPr/>
+                </a:tc>
+                <a:tc>
+                  <a:txBody>
+                    <a:bodyPr/>
+                    <a:lstStyle/>
+                    <a:p>
+                      <a:pPr algn="ctr"/>
+                      <a:r>
+                        <a:rPr lang="en-CA" sz="1100" dirty="0" smtClean="0"/>
+                        <a:t>0.82</a:t>
+                      </a:r>
+                      <a:endParaRPr lang="en-CA" sz="1100" dirty="0"/>
                     </a:p>
                   </a:txBody>
                   <a:tcPr/>
                 </a:tc>
               </a:tr>
-              <a:tr h="374003">
+              <a:tr h="325842">
                 <a:tc>
                   <a:txBody>
                     <a:bodyPr/>
@@ -4310,7 +4366,7 @@
                   <a:tcPr/>
                 </a:tc>
               </a:tr>
-              <a:tr h="374003">
+              <a:tr h="325842">
                 <a:tc>
                   <a:txBody>
                     <a:bodyPr/>
@@ -4446,7 +4502,7 @@
                   <a:tcPr/>
                 </a:tc>
               </a:tr>
-              <a:tr h="374003">
+              <a:tr h="325842">
                 <a:tc>
                   <a:txBody>
                     <a:bodyPr/>
@@ -4595,20 +4651,20 @@
           <p:nvPr>
             <p:extLst>
               <p:ext uri="{D42A27DB-BD31-4B8C-83A1-F6EECF244321}">
-                <p14:modId xmlns:p14="http://schemas.microsoft.com/office/powerpoint/2010/main" val="2210603307"/>
+                <p14:modId xmlns:p14="http://schemas.microsoft.com/office/powerpoint/2010/main" val="720987779"/>
               </p:ext>
             </p:extLst>
           </p:nvPr>
         </p:nvGraphicFramePr>
         <p:xfrm>
           <a:off x="3861047" y="1280320"/>
-          <a:ext cx="2889093" cy="2592288"/>
+          <a:ext cx="2889093" cy="2355579"/>
         </p:xfrm>
         <a:graphic>
           <a:graphicData uri="http://schemas.openxmlformats.org/drawingml/2006/table">
             <a:tbl>
               <a:tblPr firstRow="1" bandCol="1">
-                <a:tableStyleId>{5C22544A-7EE6-4342-B048-85BDC9FD1C3A}</a:tableStyleId>
+                <a:tableStyleId>{073A0DAA-6AF3-43AB-8588-CEC1D06C72B9}</a:tableStyleId>
               </a:tblPr>
               <a:tblGrid>
                 <a:gridCol w="736437"/>
@@ -4617,77 +4673,95 @@
                 <a:gridCol w="538164"/>
                 <a:gridCol w="538164"/>
               </a:tblGrid>
-              <a:tr h="278700">
+              <a:tr h="261731">
                 <a:tc>
                   <a:txBody>
                     <a:bodyPr/>
                     <a:lstStyle/>
                     <a:p>
                       <a:endParaRPr lang="en-CA" sz="800" dirty="0"/>
-                    </a:p>
-                  </a:txBody>
-                  <a:tcPr/>
-                </a:tc>
-                <a:tc gridSpan="4">
-                  <a:txBody>
-                    <a:bodyPr/>
-                    <a:lstStyle/>
-                    <a:p>
-                      <a:pPr algn="ctr"/>
-                      <a:r>
-                        <a:rPr lang="en-CA" sz="800" dirty="0" smtClean="0"/>
-                        <a:t>Support vector machine</a:t>
-                      </a:r>
-                      <a:endParaRPr lang="en-CA" sz="800" dirty="0"/>
-                    </a:p>
-                  </a:txBody>
-                  <a:tcPr/>
-                </a:tc>
-                <a:tc hMerge="1">
-                  <a:txBody>
-                    <a:bodyPr/>
-                    <a:lstStyle/>
-                    <a:p>
-                      <a:endParaRPr lang="en-CA" dirty="0"/>
-                    </a:p>
-                  </a:txBody>
-                  <a:tcPr/>
-                </a:tc>
-                <a:tc hMerge="1">
-                  <a:txBody>
-                    <a:bodyPr/>
-                    <a:lstStyle/>
-                    <a:p>
-                      <a:endParaRPr lang="en-CA" dirty="0"/>
-                    </a:p>
-                  </a:txBody>
-                  <a:tcPr/>
-                </a:tc>
-                <a:tc hMerge="1">
-                  <a:txBody>
-                    <a:bodyPr/>
-                    <a:lstStyle/>
-                    <a:p>
-                      <a:endParaRPr lang="en-CA" dirty="0"/>
-                    </a:p>
-                  </a:txBody>
-                  <a:tcPr/>
-                </a:tc>
-              </a:tr>
-              <a:tr h="278700">
-                <a:tc>
-                  <a:txBody>
-                    <a:bodyPr/>
-                    <a:lstStyle/>
-                    <a:p>
-                      <a:endParaRPr lang="en-CA" sz="800"/>
                     </a:p>
                   </a:txBody>
                   <a:tcPr>
                     <a:solidFill>
-                      <a:schemeClr val="tx2">
-                        <a:lumMod val="60000"/>
-                        <a:lumOff val="40000"/>
+                      <a:schemeClr val="tx1">
+                        <a:lumMod val="75000"/>
+                        <a:lumOff val="25000"/>
+                      </a:schemeClr>
+                    </a:solidFill>
+                  </a:tcPr>
+                </a:tc>
+                <a:tc gridSpan="4">
+                  <a:txBody>
+                    <a:bodyPr/>
+                    <a:lstStyle/>
+                    <a:p>
+                      <a:pPr algn="ctr"/>
+                      <a:r>
+                        <a:rPr lang="en-CA" sz="1000" dirty="0" smtClean="0"/>
+                        <a:t>Support vector machine</a:t>
+                      </a:r>
+                      <a:endParaRPr lang="en-CA" sz="1000" dirty="0"/>
+                    </a:p>
+                  </a:txBody>
+                  <a:tcPr>
+                    <a:solidFill>
+                      <a:schemeClr val="tx1">
+                        <a:lumMod val="75000"/>
+                        <a:lumOff val="25000"/>
+                      </a:schemeClr>
+                    </a:solidFill>
+                  </a:tcPr>
+                </a:tc>
+                <a:tc hMerge="1">
+                  <a:txBody>
+                    <a:bodyPr/>
+                    <a:lstStyle/>
+                    <a:p>
+                      <a:endParaRPr lang="en-CA" dirty="0"/>
+                    </a:p>
+                  </a:txBody>
+                  <a:tcPr/>
+                </a:tc>
+                <a:tc hMerge="1">
+                  <a:txBody>
+                    <a:bodyPr/>
+                    <a:lstStyle/>
+                    <a:p>
+                      <a:endParaRPr lang="en-CA" dirty="0"/>
+                    </a:p>
+                  </a:txBody>
+                  <a:tcPr/>
+                </a:tc>
+                <a:tc hMerge="1">
+                  <a:txBody>
+                    <a:bodyPr/>
+                    <a:lstStyle/>
+                    <a:p>
+                      <a:endParaRPr lang="en-CA" dirty="0"/>
+                    </a:p>
+                  </a:txBody>
+                  <a:tcPr/>
+                </a:tc>
+              </a:tr>
+              <a:tr h="261731">
+                <a:tc>
+                  <a:txBody>
+                    <a:bodyPr/>
+                    <a:lstStyle/>
+                    <a:p>
+                      <a:endParaRPr lang="en-CA" sz="800">
+                        <a:solidFill>
+                          <a:schemeClr val="bg1"/>
+                        </a:solidFill>
+                      </a:endParaRPr>
+                    </a:p>
+                  </a:txBody>
+                  <a:tcPr>
+                    <a:solidFill>
+                      <a:schemeClr val="tx1">
+                        <a:lumMod val="50000"/>
+                        <a:lumOff val="50000"/>
                       </a:schemeClr>
                     </a:solidFill>
                   </a:tcPr>
@@ -4715,9 +4789,9 @@
                   </a:txBody>
                   <a:tcPr>
                     <a:solidFill>
-                      <a:schemeClr val="tx2">
-                        <a:lumMod val="60000"/>
-                        <a:lumOff val="40000"/>
+                      <a:schemeClr val="tx1">
+                        <a:lumMod val="50000"/>
+                        <a:lumOff val="50000"/>
                       </a:schemeClr>
                     </a:solidFill>
                   </a:tcPr>
@@ -4763,9 +4837,9 @@
                   </a:txBody>
                   <a:tcPr>
                     <a:solidFill>
-                      <a:schemeClr val="tx2">
-                        <a:lumMod val="60000"/>
-                        <a:lumOff val="40000"/>
+                      <a:schemeClr val="tx1">
+                        <a:lumMod val="50000"/>
+                        <a:lumOff val="50000"/>
                       </a:schemeClr>
                     </a:solidFill>
                   </a:tcPr>
@@ -4781,20 +4855,23 @@
                   <a:tcPr/>
                 </a:tc>
               </a:tr>
-              <a:tr h="278700">
-                <a:tc>
-                  <a:txBody>
-                    <a:bodyPr/>
-                    <a:lstStyle/>
-                    <a:p>
-                      <a:endParaRPr lang="en-CA" sz="800"/>
+              <a:tr h="261731">
+                <a:tc>
+                  <a:txBody>
+                    <a:bodyPr/>
+                    <a:lstStyle/>
+                    <a:p>
+                      <a:endParaRPr lang="en-CA" sz="800">
+                        <a:solidFill>
+                          <a:schemeClr val="bg1"/>
+                        </a:solidFill>
+                      </a:endParaRPr>
                     </a:p>
                   </a:txBody>
                   <a:tcPr>
                     <a:solidFill>
-                      <a:schemeClr val="tx2">
-                        <a:lumMod val="40000"/>
-                        <a:lumOff val="60000"/>
+                      <a:schemeClr val="bg1">
+                        <a:lumMod val="65000"/>
                       </a:schemeClr>
                     </a:solidFill>
                   </a:tcPr>
@@ -4822,9 +4899,8 @@
                   </a:txBody>
                   <a:tcPr>
                     <a:solidFill>
-                      <a:schemeClr val="tx2">
-                        <a:lumMod val="40000"/>
-                        <a:lumOff val="60000"/>
+                      <a:schemeClr val="bg1">
+                        <a:lumMod val="65000"/>
                       </a:schemeClr>
                     </a:solidFill>
                   </a:tcPr>
@@ -4852,9 +4928,8 @@
                   </a:txBody>
                   <a:tcPr>
                     <a:solidFill>
-                      <a:schemeClr val="tx2">
-                        <a:lumMod val="40000"/>
-                        <a:lumOff val="60000"/>
+                      <a:schemeClr val="bg1">
+                        <a:lumMod val="65000"/>
                       </a:schemeClr>
                     </a:solidFill>
                   </a:tcPr>
@@ -4882,9 +4957,8 @@
                   </a:txBody>
                   <a:tcPr>
                     <a:solidFill>
-                      <a:schemeClr val="tx2">
-                        <a:lumMod val="40000"/>
-                        <a:lumOff val="60000"/>
+                      <a:schemeClr val="bg1">
+                        <a:lumMod val="65000"/>
                       </a:schemeClr>
                     </a:solidFill>
                   </a:tcPr>
@@ -4912,15 +4986,14 @@
                   </a:txBody>
                   <a:tcPr>
                     <a:solidFill>
-                      <a:schemeClr val="tx2">
-                        <a:lumMod val="40000"/>
-                        <a:lumOff val="60000"/>
+                      <a:schemeClr val="bg1">
+                        <a:lumMod val="65000"/>
                       </a:schemeClr>
                     </a:solidFill>
                   </a:tcPr>
                 </a:tc>
               </a:tr>
-              <a:tr h="292698">
+              <a:tr h="261731">
                 <a:tc>
                   <a:txBody>
                     <a:bodyPr/>
@@ -4996,7 +5069,7 @@
                   <a:tcPr/>
                 </a:tc>
               </a:tr>
-              <a:tr h="292698">
+              <a:tr h="261731">
                 <a:tc>
                   <a:txBody>
                     <a:bodyPr/>
@@ -5072,7 +5145,7 @@
                   <a:tcPr/>
                 </a:tc>
               </a:tr>
-              <a:tr h="292698">
+              <a:tr h="261731">
                 <a:tc>
                   <a:txBody>
                     <a:bodyPr/>
@@ -5148,7 +5221,7 @@
                   <a:tcPr/>
                 </a:tc>
               </a:tr>
-              <a:tr h="292698">
+              <a:tr h="261731">
                 <a:tc>
                   <a:txBody>
                     <a:bodyPr/>
@@ -5224,7 +5297,7 @@
                   <a:tcPr/>
                 </a:tc>
               </a:tr>
-              <a:tr h="292698">
+              <a:tr h="261731">
                 <a:tc>
                   <a:txBody>
                     <a:bodyPr/>
@@ -5300,7 +5373,7 @@
                   <a:tcPr/>
                 </a:tc>
               </a:tr>
-              <a:tr h="292698">
+              <a:tr h="261731">
                 <a:tc>
                   <a:txBody>
                     <a:bodyPr/>
@@ -5323,7 +5396,7 @@
                       <a:pPr algn="ctr"/>
                       <a:r>
                         <a:rPr lang="en-CA" sz="800" dirty="0" smtClean="0"/>
-                        <a:t>0.44</a:t>
+                        <a:t>0.38</a:t>
                       </a:r>
                       <a:endParaRPr lang="en-CA" sz="800" dirty="0"/>
                     </a:p>
@@ -5338,7 +5411,7 @@
                       <a:pPr algn="ctr"/>
                       <a:r>
                         <a:rPr lang="en-CA" sz="800" dirty="0" smtClean="0"/>
-                        <a:t>0.94</a:t>
+                        <a:t>0.98</a:t>
                       </a:r>
                       <a:endParaRPr lang="en-CA" sz="800" dirty="0"/>
                     </a:p>
@@ -5353,7 +5426,7 @@
                       <a:pPr algn="ctr"/>
                       <a:r>
                         <a:rPr lang="en-CA" sz="800" dirty="0" smtClean="0"/>
-                        <a:t>0.26</a:t>
+                        <a:t>0.29</a:t>
                       </a:r>
                       <a:endParaRPr lang="en-CA" sz="800" dirty="0"/>
                     </a:p>
@@ -5368,7 +5441,7 @@
                       <a:pPr algn="ctr"/>
                       <a:r>
                         <a:rPr lang="en-CA" sz="800" dirty="0" smtClean="0"/>
-                        <a:t>0.91</a:t>
+                        <a:t>0.95</a:t>
                       </a:r>
                       <a:endParaRPr lang="en-CA" sz="800" dirty="0"/>
                     </a:p>
@@ -5504,36 +5577,150 @@
           </a:p>
         </p:txBody>
       </p:sp>
-      <p:pic>
-        <p:nvPicPr>
-          <p:cNvPr id="19" name="Picture 18"/>
-          <p:cNvPicPr>
-            <a:picLocks noChangeAspect="1"/>
-          </p:cNvPicPr>
+      <p:sp>
+        <p:nvSpPr>
+          <p:cNvPr id="2" name="TextBox 1"/>
+          <p:cNvSpPr txBox="1"/>
           <p:nvPr/>
-        </p:nvPicPr>
-        <p:blipFill>
-          <a:blip r:embed="rId6" cstate="print">
-            <a:extLst>
-              <a:ext uri="{28A0092B-C50C-407E-A947-70E740481C1C}">
-                <a14:useLocalDpi xmlns:a14="http://schemas.microsoft.com/office/drawing/2010/main" val="0"/>
-              </a:ext>
-            </a:extLst>
-          </a:blip>
-          <a:stretch>
-            <a:fillRect/>
-          </a:stretch>
-        </p:blipFill>
+        </p:nvSpPr>
         <p:spPr>
           <a:xfrm>
-            <a:off x="3796989" y="7122705"/>
-            <a:ext cx="3001317" cy="2021295"/>
+            <a:off x="-1899592" y="3722594"/>
+            <a:ext cx="3213358" cy="861774"/>
           </a:xfrm>
           <a:prstGeom prst="rect">
             <a:avLst/>
           </a:prstGeom>
+          <a:noFill/>
         </p:spPr>
-      </p:pic>
+        <p:txBody>
+          <a:bodyPr wrap="square" rtlCol="0">
+            <a:spAutoFit/>
+          </a:bodyPr>
+          <a:lstStyle/>
+          <a:p>
+            <a:r>
+              <a:rPr lang="en-CA" sz="1000" dirty="0" smtClean="0"/>
+              <a:t>Figure 2. Unsupervised principal components analysis of all data demonstrates that the first two components do not separate samples by cytogenetic risk category. A similar result is shown for the three large-scale copy number alterations (del_5, del_7, trisomy_8).</a:t>
+            </a:r>
+            <a:endParaRPr lang="en-CA" sz="1000" dirty="0"/>
+          </a:p>
+        </p:txBody>
+      </p:sp>
+      <p:sp>
+        <p:nvSpPr>
+          <p:cNvPr id="3" name="TextBox 2"/>
+          <p:cNvSpPr txBox="1"/>
+          <p:nvPr/>
+        </p:nvSpPr>
+        <p:spPr>
+          <a:xfrm>
+            <a:off x="4077072" y="3995936"/>
+            <a:ext cx="2592288" cy="861774"/>
+          </a:xfrm>
+          <a:prstGeom prst="rect">
+            <a:avLst/>
+          </a:prstGeom>
+          <a:noFill/>
+        </p:spPr>
+        <p:txBody>
+          <a:bodyPr wrap="square" rtlCol="0">
+            <a:spAutoFit/>
+          </a:bodyPr>
+          <a:lstStyle/>
+          <a:p>
+            <a:r>
+              <a:rPr lang="en-CA" sz="1000" dirty="0" smtClean="0"/>
+              <a:t>Table 1. </a:t>
+            </a:r>
+            <a:r>
+              <a:rPr lang="en-CA" sz="1000" dirty="0" err="1" smtClean="0"/>
+              <a:t>Kernelized</a:t>
+            </a:r>
+            <a:r>
+              <a:rPr lang="en-CA" sz="1000" dirty="0" smtClean="0"/>
+              <a:t> SVMs trained using the first 20 principal components as features showed generally poor performance at predicting cytogenetic risk and copy number alterations.</a:t>
+            </a:r>
+            <a:endParaRPr lang="en-CA" sz="1000" dirty="0"/>
+          </a:p>
+        </p:txBody>
+      </p:sp>
+      <p:sp>
+        <p:nvSpPr>
+          <p:cNvPr id="17" name="TextBox 16"/>
+          <p:cNvSpPr txBox="1"/>
+          <p:nvPr/>
+        </p:nvSpPr>
+        <p:spPr>
+          <a:xfrm>
+            <a:off x="3573016" y="7956376"/>
+            <a:ext cx="3726414" cy="1323439"/>
+          </a:xfrm>
+          <a:prstGeom prst="rect">
+            <a:avLst/>
+          </a:prstGeom>
+          <a:noFill/>
+        </p:spPr>
+        <p:txBody>
+          <a:bodyPr wrap="square" rtlCol="0">
+            <a:spAutoFit/>
+          </a:bodyPr>
+          <a:lstStyle/>
+          <a:p>
+            <a:r>
+              <a:rPr lang="en-CA" sz="1000" dirty="0" smtClean="0"/>
+              <a:t>Table 2. Random forests and SVMs were trained using two different supervised feature selection methods: 1) Taking the top 25 differentially expressed genes using </a:t>
+            </a:r>
+            <a:r>
+              <a:rPr lang="en-CA" sz="1000" dirty="0" err="1" smtClean="0"/>
+              <a:t>voom+limma</a:t>
+            </a:r>
+            <a:r>
+              <a:rPr lang="en-CA" sz="1000" dirty="0" smtClean="0"/>
+              <a:t>; 2) Taking the 25 genes whose expression are most correlated with the outcomes.  The random forests slightly outperformed the SVMs, and the most sensitive classifiers were those trained to predict the “Good” cytogenetic risk class. The random forest classifiers for CNA events also showed good performance.</a:t>
+            </a:r>
+            <a:endParaRPr lang="en-CA" sz="1000" dirty="0"/>
+          </a:p>
+        </p:txBody>
+      </p:sp>
+      <p:sp>
+        <p:nvSpPr>
+          <p:cNvPr id="18" name="TextBox 17"/>
+          <p:cNvSpPr txBox="1"/>
+          <p:nvPr/>
+        </p:nvSpPr>
+        <p:spPr>
+          <a:xfrm>
+            <a:off x="-747464" y="8486324"/>
+            <a:ext cx="3213358" cy="707886"/>
+          </a:xfrm>
+          <a:prstGeom prst="rect">
+            <a:avLst/>
+          </a:prstGeom>
+          <a:noFill/>
+        </p:spPr>
+        <p:txBody>
+          <a:bodyPr wrap="square" rtlCol="0">
+            <a:spAutoFit/>
+          </a:bodyPr>
+          <a:lstStyle/>
+          <a:p>
+            <a:r>
+              <a:rPr lang="en-CA" sz="1000" dirty="0" smtClean="0"/>
+              <a:t>Figure 3. A 5-fold cross validation was performed for the classifier to predict the del_5 CNA using the 25 most differentially expressed genes (</a:t>
+            </a:r>
+            <a:r>
+              <a:rPr lang="en-CA" sz="1000" dirty="0" err="1" smtClean="0"/>
+              <a:t>voom+limma</a:t>
+            </a:r>
+            <a:r>
+              <a:rPr lang="en-CA" sz="1000" dirty="0" smtClean="0"/>
+              <a:t>). Of the 25 genes selected in each fold, 12 were common to all 5.</a:t>
+            </a:r>
+            <a:endParaRPr lang="en-CA" sz="1000" dirty="0"/>
+          </a:p>
+        </p:txBody>
+      </p:sp>
     </p:spTree>
     <p:extLst>
       <p:ext uri="{BB962C8B-B14F-4D97-AF65-F5344CB8AC3E}">

</xml_diff>